<commit_message>
Add PICS for scale
</commit_message>
<xml_diff>
--- a/resources/screens generator.pptx
+++ b/resources/screens generator.pptx
@@ -312,7 +312,7 @@
           <a:p>
             <a:fld id="{3D0F2683-DC5F-4C11-8026-67D13E7C15A4}" type="datetimeFigureOut">
               <a:rPr lang="en-US" smtClean="0"/>
-              <a:t>10/20/2018</a:t>
+              <a:t>2/14/2019</a:t>
             </a:fld>
             <a:endParaRPr lang="en-US"/>
           </a:p>
@@ -482,7 +482,7 @@
           <a:p>
             <a:fld id="{3D0F2683-DC5F-4C11-8026-67D13E7C15A4}" type="datetimeFigureOut">
               <a:rPr lang="en-US" smtClean="0"/>
-              <a:t>10/20/2018</a:t>
+              <a:t>2/14/2019</a:t>
             </a:fld>
             <a:endParaRPr lang="en-US"/>
           </a:p>
@@ -662,7 +662,7 @@
           <a:p>
             <a:fld id="{3D0F2683-DC5F-4C11-8026-67D13E7C15A4}" type="datetimeFigureOut">
               <a:rPr lang="en-US" smtClean="0"/>
-              <a:t>10/20/2018</a:t>
+              <a:t>2/14/2019</a:t>
             </a:fld>
             <a:endParaRPr lang="en-US"/>
           </a:p>
@@ -832,7 +832,7 @@
           <a:p>
             <a:fld id="{3D0F2683-DC5F-4C11-8026-67D13E7C15A4}" type="datetimeFigureOut">
               <a:rPr lang="en-US" smtClean="0"/>
-              <a:t>10/20/2018</a:t>
+              <a:t>2/14/2019</a:t>
             </a:fld>
             <a:endParaRPr lang="en-US"/>
           </a:p>
@@ -1078,7 +1078,7 @@
           <a:p>
             <a:fld id="{3D0F2683-DC5F-4C11-8026-67D13E7C15A4}" type="datetimeFigureOut">
               <a:rPr lang="en-US" smtClean="0"/>
-              <a:t>10/20/2018</a:t>
+              <a:t>2/14/2019</a:t>
             </a:fld>
             <a:endParaRPr lang="en-US"/>
           </a:p>
@@ -1366,7 +1366,7 @@
           <a:p>
             <a:fld id="{3D0F2683-DC5F-4C11-8026-67D13E7C15A4}" type="datetimeFigureOut">
               <a:rPr lang="en-US" smtClean="0"/>
-              <a:t>10/20/2018</a:t>
+              <a:t>2/14/2019</a:t>
             </a:fld>
             <a:endParaRPr lang="en-US"/>
           </a:p>
@@ -1788,7 +1788,7 @@
           <a:p>
             <a:fld id="{3D0F2683-DC5F-4C11-8026-67D13E7C15A4}" type="datetimeFigureOut">
               <a:rPr lang="en-US" smtClean="0"/>
-              <a:t>10/20/2018</a:t>
+              <a:t>2/14/2019</a:t>
             </a:fld>
             <a:endParaRPr lang="en-US"/>
           </a:p>
@@ -1906,7 +1906,7 @@
           <a:p>
             <a:fld id="{3D0F2683-DC5F-4C11-8026-67D13E7C15A4}" type="datetimeFigureOut">
               <a:rPr lang="en-US" smtClean="0"/>
-              <a:t>10/20/2018</a:t>
+              <a:t>2/14/2019</a:t>
             </a:fld>
             <a:endParaRPr lang="en-US"/>
           </a:p>
@@ -2001,7 +2001,7 @@
           <a:p>
             <a:fld id="{3D0F2683-DC5F-4C11-8026-67D13E7C15A4}" type="datetimeFigureOut">
               <a:rPr lang="en-US" smtClean="0"/>
-              <a:t>10/20/2018</a:t>
+              <a:t>2/14/2019</a:t>
             </a:fld>
             <a:endParaRPr lang="en-US"/>
           </a:p>
@@ -2278,7 +2278,7 @@
           <a:p>
             <a:fld id="{3D0F2683-DC5F-4C11-8026-67D13E7C15A4}" type="datetimeFigureOut">
               <a:rPr lang="en-US" smtClean="0"/>
-              <a:t>10/20/2018</a:t>
+              <a:t>2/14/2019</a:t>
             </a:fld>
             <a:endParaRPr lang="en-US"/>
           </a:p>
@@ -2531,7 +2531,7 @@
           <a:p>
             <a:fld id="{3D0F2683-DC5F-4C11-8026-67D13E7C15A4}" type="datetimeFigureOut">
               <a:rPr lang="en-US" smtClean="0"/>
-              <a:t>10/20/2018</a:t>
+              <a:t>2/14/2019</a:t>
             </a:fld>
             <a:endParaRPr lang="en-US"/>
           </a:p>
@@ -2744,7 +2744,7 @@
           <a:p>
             <a:fld id="{3D0F2683-DC5F-4C11-8026-67D13E7C15A4}" type="datetimeFigureOut">
               <a:rPr lang="en-US" smtClean="0"/>
-              <a:t>10/20/2018</a:t>
+              <a:t>2/14/2019</a:t>
             </a:fld>
             <a:endParaRPr lang="en-US"/>
           </a:p>
@@ -3515,8 +3515,8 @@
         </p:nvSpPr>
         <p:spPr>
           <a:xfrm>
-            <a:off x="990600" y="759042"/>
-            <a:ext cx="6553200" cy="4278094"/>
+            <a:off x="360860" y="644094"/>
+            <a:ext cx="8478339" cy="5755422"/>
           </a:xfrm>
           <a:prstGeom prst="rect">
             <a:avLst/>
@@ -3529,67 +3529,85 @@
           </a:bodyPr>
           <a:lstStyle/>
           <a:p>
-            <a:pPr algn="ctr"/>
+            <a:pPr algn="ctr" rtl="1"/>
+            <a:r>
+              <a:rPr lang="he-IL" sz="3200" b="1" dirty="0"/>
+              <a:t>באיזה מועמד היית בוחר לראשות הממשלה אם הבחירות היו מתקיימות היום?  </a:t>
+            </a:r>
+            <a:endParaRPr lang="he-IL" sz="3200" b="1" dirty="0" smtClean="0"/>
+          </a:p>
+          <a:p>
+            <a:pPr algn="ctr" rtl="1"/>
+            <a:endParaRPr lang="en-US" sz="2400" b="1" dirty="0" smtClean="0"/>
+          </a:p>
+          <a:p>
+            <a:pPr algn="r" rtl="1"/>
             <a:r>
               <a:rPr lang="he-IL" sz="2400" dirty="0" smtClean="0"/>
-              <a:t>הוראות:</a:t>
-            </a:r>
-          </a:p>
-          <a:p>
-            <a:pPr algn="ctr" rtl="1"/>
-            <a:endParaRPr lang="he-IL" sz="1600" dirty="0" smtClean="0"/>
-          </a:p>
-          <a:p>
-            <a:pPr algn="ctr" rtl="1"/>
-            <a:r>
-              <a:rPr lang="he-IL" sz="1600" dirty="0" smtClean="0"/>
-              <a:t>בחלק הזה של הניסוי יוצגו על המסך 2 תמונות של פוליטיקאים מוכרים.</a:t>
-            </a:r>
-          </a:p>
-          <a:p>
-            <a:pPr algn="ctr" rtl="1"/>
-            <a:r>
-              <a:rPr lang="he-IL" sz="1600" dirty="0" smtClean="0"/>
-              <a:t>לפני הצגת התמונות תהיה נקודת פיקסציה באמצע של המסך, אנא הסתכל/י עליה בתחילת הניסוי.</a:t>
-            </a:r>
-          </a:p>
-          <a:p>
-            <a:pPr algn="ctr" rtl="1"/>
-            <a:r>
-              <a:rPr lang="he-IL" sz="1600" dirty="0" smtClean="0"/>
-              <a:t>לאחר מכן תתבקש/י לבחור את המועמד שאת/ה חושב/ת שהכי יתאימו להיות בתפקיד ראש הממשלה.</a:t>
-            </a:r>
-          </a:p>
-          <a:p>
-            <a:pPr algn="ctr" rtl="1"/>
-            <a:r>
-              <a:rPr lang="he-IL" sz="1600" dirty="0" smtClean="0"/>
-              <a:t>על מנת לבחור את המועמד לפי בחירתך תשתמש בחצים הבאים:</a:t>
-            </a:r>
-          </a:p>
-          <a:p>
-            <a:pPr algn="ctr" rtl="1"/>
+              <a:t>בכל </a:t>
+            </a:r>
+            <a:r>
+              <a:rPr lang="he-IL" sz="2400" dirty="0"/>
+              <a:t>צעד בניסוי יוצגו בפנייך שתי תמונות של פוליטיקאים/ות. </a:t>
+            </a:r>
+          </a:p>
+          <a:p>
+            <a:pPr algn="r" rtl="1"/>
+            <a:r>
+              <a:rPr lang="he-IL" sz="2400" dirty="0"/>
+              <a:t>עלייך לבחור במי השניים היית בוחר/ת המידה והבחירות היו מתקיימות היום ואלו היו המועמדים היחידים?</a:t>
+            </a:r>
+          </a:p>
+          <a:p>
+            <a:pPr algn="r" rtl="1"/>
+            <a:r>
+              <a:rPr lang="he-IL" sz="2400" dirty="0"/>
+              <a:t>כל צעד יתחיל בהצגה של הסימן + במרכז המסך. אנא התמקדו במרכזו עד שיופיעו תמונות המועמדים. לאחר הופעת שתי התמונות בחרו במועמד שלכם באמצעות החיצים. </a:t>
+            </a:r>
+          </a:p>
+          <a:p>
+            <a:pPr algn="r"/>
             <a:endParaRPr lang="he-IL" sz="1600" dirty="0"/>
           </a:p>
           <a:p>
             <a:pPr algn="r"/>
             <a:r>
+              <a:rPr lang="he-IL" sz="2400" dirty="0" smtClean="0"/>
+              <a:t>         לתמונה </a:t>
+            </a:r>
+            <a:r>
               <a:rPr lang="he-IL" sz="2400" dirty="0"/>
-              <a:t>לתמונה מצד ימין</a:t>
+              <a:t>מצד </a:t>
+            </a:r>
+            <a:r>
+              <a:rPr lang="he-IL" sz="2400" dirty="0" smtClean="0"/>
+              <a:t>ימי</a:t>
+            </a:r>
+            <a:r>
+              <a:rPr lang="he-IL" sz="2400" dirty="0"/>
+              <a:t>ן</a:t>
             </a:r>
           </a:p>
           <a:p>
             <a:pPr algn="r"/>
             <a:r>
+              <a:rPr lang="he-IL" sz="2400" dirty="0" smtClean="0"/>
+              <a:t>         לתמונה </a:t>
+            </a:r>
+            <a:r>
               <a:rPr lang="he-IL" sz="2400" dirty="0"/>
-              <a:t>לתמונה מצד שמאל</a:t>
+              <a:t>מצד שמאל</a:t>
             </a:r>
           </a:p>
           <a:p>
             <a:pPr algn="r"/>
             <a:r>
+              <a:rPr lang="he-IL" sz="2400" dirty="0" smtClean="0"/>
+              <a:t>         אם </a:t>
+            </a:r>
+            <a:r>
               <a:rPr lang="he-IL" sz="2400" dirty="0"/>
-              <a:t>אם בחרת </a:t>
+              <a:t>בחרת </a:t>
             </a:r>
             <a:r>
               <a:rPr lang="he-IL" sz="2400" dirty="0" smtClean="0"/>
@@ -3619,7 +3637,7 @@
         </p:nvSpPr>
         <p:spPr>
           <a:xfrm>
-            <a:off x="7622177" y="3048000"/>
+            <a:off x="8193676" y="4419600"/>
             <a:ext cx="645523" cy="457200"/>
           </a:xfrm>
           <a:prstGeom prst="rightArrow">
@@ -3666,7 +3684,7 @@
         </p:nvSpPr>
         <p:spPr>
           <a:xfrm rot="10800000">
-            <a:off x="7516041" y="3430378"/>
+            <a:off x="8087540" y="4801978"/>
             <a:ext cx="693420" cy="457200"/>
           </a:xfrm>
           <a:prstGeom prst="rightArrow">
@@ -3709,7 +3727,7 @@
         </p:nvSpPr>
         <p:spPr>
           <a:xfrm rot="5400000">
-            <a:off x="7687343" y="3876707"/>
+            <a:off x="8258842" y="5248307"/>
             <a:ext cx="515189" cy="435429"/>
           </a:xfrm>
           <a:prstGeom prst="rightArrow">
@@ -4134,8 +4152,8 @@
         </p:nvSpPr>
         <p:spPr>
           <a:xfrm>
-            <a:off x="1004876" y="533400"/>
-            <a:ext cx="7224724" cy="3416320"/>
+            <a:off x="228600" y="533400"/>
+            <a:ext cx="8382000" cy="4832092"/>
           </a:xfrm>
           <a:prstGeom prst="rect">
             <a:avLst/>
@@ -4150,7 +4168,7 @@
           <a:p>
             <a:pPr algn="ctr"/>
             <a:r>
-              <a:rPr lang="he-IL" sz="3200" dirty="0" smtClean="0"/>
+              <a:rPr lang="he-IL" sz="4000" b="1" dirty="0" smtClean="0"/>
               <a:t>הוראות:</a:t>
             </a:r>
           </a:p>
@@ -4159,51 +4177,25 @@
             <a:endParaRPr lang="he-IL" sz="2000" dirty="0" smtClean="0"/>
           </a:p>
           <a:p>
-            <a:pPr algn="ctr" rtl="1"/>
-            <a:r>
-              <a:rPr lang="he-IL" sz="2000" dirty="0" smtClean="0"/>
-              <a:t>בחלק הזה של הניסוי, </a:t>
-            </a:r>
-            <a:r>
-              <a:rPr lang="he-IL" sz="2000" dirty="0" smtClean="0"/>
-              <a:t>יוצגו </a:t>
-            </a:r>
-            <a:r>
-              <a:rPr lang="he-IL" sz="2000" dirty="0" smtClean="0"/>
-              <a:t>על המסך </a:t>
-            </a:r>
-            <a:r>
-              <a:rPr lang="he-IL" sz="2000" dirty="0" smtClean="0"/>
-              <a:t>תמונה של פוליטיקאי מוכר.</a:t>
-            </a:r>
-            <a:endParaRPr lang="he-IL" sz="2000" dirty="0" smtClean="0"/>
-          </a:p>
-          <a:p>
-            <a:pPr algn="ctr" rtl="1"/>
-            <a:r>
-              <a:rPr lang="he-IL" sz="2000" dirty="0" smtClean="0"/>
+            <a:pPr algn="r" rtl="1"/>
+            <a:r>
+              <a:rPr lang="he-IL" sz="3200" dirty="0" smtClean="0"/>
+              <a:t>בחלק הזה של הניסוי, יוצגו על המסך תמונה של פוליטיקאי מוכר.</a:t>
+            </a:r>
+          </a:p>
+          <a:p>
+            <a:pPr algn="r" rtl="1"/>
+            <a:r>
+              <a:rPr lang="he-IL" sz="3200" dirty="0" smtClean="0"/>
               <a:t>לפני הצגת התמונות תהיה נקודת פיקסציה באמצע של המסך, אנא הסתכל עליה בתחילת הניסוי.</a:t>
             </a:r>
           </a:p>
           <a:p>
-            <a:pPr algn="ctr" rtl="1"/>
-            <a:r>
-              <a:rPr lang="he-IL" sz="2000" dirty="0" smtClean="0"/>
-              <a:t>לאחר מכן </a:t>
-            </a:r>
-            <a:r>
-              <a:rPr lang="he-IL" sz="2000" dirty="0" smtClean="0"/>
-              <a:t>תוצג התמונה, </a:t>
-            </a:r>
-            <a:r>
-              <a:rPr lang="he-IL" sz="2000" dirty="0" smtClean="0"/>
-              <a:t>הבט/י </a:t>
-            </a:r>
-            <a:r>
-              <a:rPr lang="he-IL" sz="2000" dirty="0" smtClean="0"/>
-              <a:t>עליה.</a:t>
-            </a:r>
-            <a:endParaRPr lang="he-IL" sz="2000" dirty="0" smtClean="0"/>
+            <a:pPr algn="r" rtl="1"/>
+            <a:r>
+              <a:rPr lang="he-IL" sz="3200" dirty="0" smtClean="0"/>
+              <a:t>לאחר מכן תוצג התמונה, הבט/י עליה.</a:t>
+            </a:r>
           </a:p>
           <a:p>
             <a:pPr algn="ctr" rtl="1"/>
@@ -4220,22 +4212,22 @@
           <a:p>
             <a:pPr algn="ctr" rtl="1"/>
             <a:r>
-              <a:rPr lang="he-IL" sz="2400" b="1" dirty="0" smtClean="0"/>
-              <a:t>לאחר מכן תתבקש/י לדרג את </a:t>
-            </a:r>
-            <a:r>
-              <a:rPr lang="he-IL" sz="2400" b="1" dirty="0" smtClean="0"/>
-              <a:t>המועמד </a:t>
-            </a:r>
-            <a:r>
-              <a:rPr lang="he-IL" sz="2400" b="1" dirty="0" smtClean="0"/>
-              <a:t>במספר בין 1 ל9</a:t>
-            </a:r>
-            <a:r>
-              <a:rPr lang="he-IL" sz="2400" b="1" dirty="0" smtClean="0"/>
+              <a:rPr lang="he-IL" sz="2800" b="1" dirty="0" smtClean="0"/>
+              <a:t>לאחר מכן תתבקש/י לדרג את המועמד במספר בין 1 </a:t>
+            </a:r>
+            <a:r>
+              <a:rPr lang="he-IL" sz="2800" b="1" dirty="0" smtClean="0"/>
+              <a:t>ל</a:t>
+            </a:r>
+            <a:r>
+              <a:rPr lang="en-US" sz="2800" b="1" dirty="0" smtClean="0"/>
+              <a:t>10</a:t>
+            </a:r>
+            <a:r>
+              <a:rPr lang="he-IL" sz="2800" b="1" dirty="0" smtClean="0"/>
               <a:t>.</a:t>
             </a:r>
-            <a:endParaRPr lang="he-IL" sz="2400" b="1" dirty="0" smtClean="0"/>
+            <a:endParaRPr lang="he-IL" sz="2800" b="1" dirty="0" smtClean="0"/>
           </a:p>
         </p:txBody>
       </p:sp>

</xml_diff>

<commit_message>
change block 1 to be 3 seconds for each couple, remove avoidance and change instruction according to the new changes
</commit_message>
<xml_diff>
--- a/resources/screens generator.pptx
+++ b/resources/screens generator.pptx
@@ -312,7 +312,7 @@
           <a:p>
             <a:fld id="{3D0F2683-DC5F-4C11-8026-67D13E7C15A4}" type="datetimeFigureOut">
               <a:rPr lang="en-US" smtClean="0"/>
-              <a:t>2/25/2019</a:t>
+              <a:t>3/24/2019</a:t>
             </a:fld>
             <a:endParaRPr lang="en-US"/>
           </a:p>
@@ -482,7 +482,7 @@
           <a:p>
             <a:fld id="{3D0F2683-DC5F-4C11-8026-67D13E7C15A4}" type="datetimeFigureOut">
               <a:rPr lang="en-US" smtClean="0"/>
-              <a:t>2/25/2019</a:t>
+              <a:t>3/24/2019</a:t>
             </a:fld>
             <a:endParaRPr lang="en-US"/>
           </a:p>
@@ -662,7 +662,7 @@
           <a:p>
             <a:fld id="{3D0F2683-DC5F-4C11-8026-67D13E7C15A4}" type="datetimeFigureOut">
               <a:rPr lang="en-US" smtClean="0"/>
-              <a:t>2/25/2019</a:t>
+              <a:t>3/24/2019</a:t>
             </a:fld>
             <a:endParaRPr lang="en-US"/>
           </a:p>
@@ -832,7 +832,7 @@
           <a:p>
             <a:fld id="{3D0F2683-DC5F-4C11-8026-67D13E7C15A4}" type="datetimeFigureOut">
               <a:rPr lang="en-US" smtClean="0"/>
-              <a:t>2/25/2019</a:t>
+              <a:t>3/24/2019</a:t>
             </a:fld>
             <a:endParaRPr lang="en-US"/>
           </a:p>
@@ -1078,7 +1078,7 @@
           <a:p>
             <a:fld id="{3D0F2683-DC5F-4C11-8026-67D13E7C15A4}" type="datetimeFigureOut">
               <a:rPr lang="en-US" smtClean="0"/>
-              <a:t>2/25/2019</a:t>
+              <a:t>3/24/2019</a:t>
             </a:fld>
             <a:endParaRPr lang="en-US"/>
           </a:p>
@@ -1366,7 +1366,7 @@
           <a:p>
             <a:fld id="{3D0F2683-DC5F-4C11-8026-67D13E7C15A4}" type="datetimeFigureOut">
               <a:rPr lang="en-US" smtClean="0"/>
-              <a:t>2/25/2019</a:t>
+              <a:t>3/24/2019</a:t>
             </a:fld>
             <a:endParaRPr lang="en-US"/>
           </a:p>
@@ -1788,7 +1788,7 @@
           <a:p>
             <a:fld id="{3D0F2683-DC5F-4C11-8026-67D13E7C15A4}" type="datetimeFigureOut">
               <a:rPr lang="en-US" smtClean="0"/>
-              <a:t>2/25/2019</a:t>
+              <a:t>3/24/2019</a:t>
             </a:fld>
             <a:endParaRPr lang="en-US"/>
           </a:p>
@@ -1906,7 +1906,7 @@
           <a:p>
             <a:fld id="{3D0F2683-DC5F-4C11-8026-67D13E7C15A4}" type="datetimeFigureOut">
               <a:rPr lang="en-US" smtClean="0"/>
-              <a:t>2/25/2019</a:t>
+              <a:t>3/24/2019</a:t>
             </a:fld>
             <a:endParaRPr lang="en-US"/>
           </a:p>
@@ -2001,7 +2001,7 @@
           <a:p>
             <a:fld id="{3D0F2683-DC5F-4C11-8026-67D13E7C15A4}" type="datetimeFigureOut">
               <a:rPr lang="en-US" smtClean="0"/>
-              <a:t>2/25/2019</a:t>
+              <a:t>3/24/2019</a:t>
             </a:fld>
             <a:endParaRPr lang="en-US"/>
           </a:p>
@@ -2278,7 +2278,7 @@
           <a:p>
             <a:fld id="{3D0F2683-DC5F-4C11-8026-67D13E7C15A4}" type="datetimeFigureOut">
               <a:rPr lang="en-US" smtClean="0"/>
-              <a:t>2/25/2019</a:t>
+              <a:t>3/24/2019</a:t>
             </a:fld>
             <a:endParaRPr lang="en-US"/>
           </a:p>
@@ -2531,7 +2531,7 @@
           <a:p>
             <a:fld id="{3D0F2683-DC5F-4C11-8026-67D13E7C15A4}" type="datetimeFigureOut">
               <a:rPr lang="en-US" smtClean="0"/>
-              <a:t>2/25/2019</a:t>
+              <a:t>3/24/2019</a:t>
             </a:fld>
             <a:endParaRPr lang="en-US"/>
           </a:p>
@@ -2744,7 +2744,7 @@
           <a:p>
             <a:fld id="{3D0F2683-DC5F-4C11-8026-67D13E7C15A4}" type="datetimeFigureOut">
               <a:rPr lang="en-US" smtClean="0"/>
-              <a:t>2/25/2019</a:t>
+              <a:t>3/24/2019</a:t>
             </a:fld>
             <a:endParaRPr lang="en-US"/>
           </a:p>
@@ -3516,7 +3516,7 @@
         <p:spPr>
           <a:xfrm>
             <a:off x="360860" y="644094"/>
-            <a:ext cx="8478339" cy="5755422"/>
+            <a:ext cx="8478339" cy="5878532"/>
           </a:xfrm>
           <a:prstGeom prst="rect">
             <a:avLst/>
@@ -3573,47 +3573,39 @@
             <a:pPr algn="r"/>
             <a:r>
               <a:rPr lang="he-IL" sz="2400" dirty="0" smtClean="0"/>
-              <a:t>         לתמונה </a:t>
-            </a:r>
-            <a:r>
-              <a:rPr lang="he-IL" sz="2400" dirty="0"/>
+              <a:t>         </a:t>
+            </a:r>
+            <a:r>
+              <a:rPr lang="he-IL" sz="4000" dirty="0" smtClean="0"/>
+              <a:t>לתמונה </a:t>
+            </a:r>
+            <a:r>
+              <a:rPr lang="he-IL" sz="4000" dirty="0"/>
               <a:t>מצד </a:t>
             </a:r>
             <a:r>
-              <a:rPr lang="he-IL" sz="2400" dirty="0" smtClean="0"/>
+              <a:rPr lang="he-IL" sz="4000" dirty="0" smtClean="0"/>
               <a:t>ימי</a:t>
             </a:r>
             <a:r>
-              <a:rPr lang="he-IL" sz="2400" dirty="0"/>
+              <a:rPr lang="he-IL" sz="4000" dirty="0"/>
               <a:t>ן</a:t>
             </a:r>
           </a:p>
           <a:p>
             <a:pPr algn="r"/>
             <a:r>
-              <a:rPr lang="he-IL" sz="2400" dirty="0" smtClean="0"/>
-              <a:t>         לתמונה </a:t>
-            </a:r>
-            <a:r>
-              <a:rPr lang="he-IL" sz="2400" dirty="0"/>
+              <a:rPr lang="he-IL" sz="4000" dirty="0" smtClean="0"/>
+              <a:t>     </a:t>
+            </a:r>
+            <a:r>
+              <a:rPr lang="he-IL" sz="4000" dirty="0" smtClean="0"/>
+              <a:t>לתמונה </a:t>
+            </a:r>
+            <a:r>
+              <a:rPr lang="he-IL" sz="4000" dirty="0"/>
               <a:t>מצד שמאל</a:t>
             </a:r>
-          </a:p>
-          <a:p>
-            <a:pPr algn="r"/>
-            <a:r>
-              <a:rPr lang="he-IL" sz="2400" dirty="0" smtClean="0"/>
-              <a:t>         אם </a:t>
-            </a:r>
-            <a:r>
-              <a:rPr lang="he-IL" sz="2400" dirty="0"/>
-              <a:t>בחרת </a:t>
-            </a:r>
-            <a:r>
-              <a:rPr lang="he-IL" sz="2400" dirty="0" smtClean="0"/>
-              <a:t>להימנע</a:t>
-            </a:r>
-            <a:endParaRPr lang="he-IL" sz="1600" dirty="0" smtClean="0"/>
           </a:p>
           <a:p>
             <a:pPr algn="ctr" rtl="1"/>
@@ -3637,7 +3629,7 @@
         </p:nvSpPr>
         <p:spPr>
           <a:xfrm>
-            <a:off x="8193676" y="4419600"/>
+            <a:off x="8176584" y="4572000"/>
             <a:ext cx="645523" cy="457200"/>
           </a:xfrm>
           <a:prstGeom prst="rightArrow">
@@ -3684,51 +3676,8 @@
         </p:nvSpPr>
         <p:spPr>
           <a:xfrm rot="10800000">
-            <a:off x="8087540" y="4801978"/>
+            <a:off x="8145779" y="5242513"/>
             <a:ext cx="693420" cy="457200"/>
-          </a:xfrm>
-          <a:prstGeom prst="rightArrow">
-            <a:avLst/>
-          </a:prstGeom>
-          <a:solidFill>
-            <a:srgbClr val="FF0000"/>
-          </a:solidFill>
-        </p:spPr>
-        <p:style>
-          <a:lnRef idx="2">
-            <a:schemeClr val="accent1">
-              <a:shade val="50000"/>
-            </a:schemeClr>
-          </a:lnRef>
-          <a:fillRef idx="1">
-            <a:schemeClr val="accent1"/>
-          </a:fillRef>
-          <a:effectRef idx="0">
-            <a:schemeClr val="accent1"/>
-          </a:effectRef>
-          <a:fontRef idx="minor">
-            <a:schemeClr val="lt1"/>
-          </a:fontRef>
-        </p:style>
-        <p:txBody>
-          <a:bodyPr rtlCol="0" anchor="ctr"/>
-          <a:lstStyle/>
-          <a:p>
-            <a:pPr algn="ctr"/>
-            <a:endParaRPr lang="en-US"/>
-          </a:p>
-        </p:txBody>
-      </p:sp>
-      <p:sp>
-        <p:nvSpPr>
-          <p:cNvPr id="8" name="Right Arrow 7"/>
-          <p:cNvSpPr/>
-          <p:nvPr/>
-        </p:nvSpPr>
-        <p:spPr>
-          <a:xfrm rot="5400000">
-            <a:off x="8258842" y="5248307"/>
-            <a:ext cx="515189" cy="435429"/>
           </a:xfrm>
           <a:prstGeom prst="rightArrow">
             <a:avLst/>
@@ -3815,8 +3764,8 @@
         </p:nvSpPr>
         <p:spPr>
           <a:xfrm>
-            <a:off x="1143000" y="762000"/>
-            <a:ext cx="7086600" cy="4216539"/>
+            <a:off x="457200" y="762000"/>
+            <a:ext cx="7772400" cy="4216539"/>
           </a:xfrm>
           <a:prstGeom prst="rect">
             <a:avLst/>
@@ -3831,32 +3780,41 @@
           <a:p>
             <a:pPr algn="ctr"/>
             <a:r>
-              <a:rPr lang="he-IL" sz="5400" u="sng" dirty="0" smtClean="0"/>
+              <a:rPr lang="he-IL" sz="6600" u="sng" dirty="0" smtClean="0"/>
               <a:t>השתמשת במקש לא חוקי, אנא השתמש ב:</a:t>
             </a:r>
-            <a:endParaRPr lang="he-IL" sz="5400" u="sng" dirty="0"/>
-          </a:p>
-          <a:p>
-            <a:pPr algn="r"/>
-            <a:r>
-              <a:rPr lang="he-IL" sz="4800" dirty="0" smtClean="0"/>
-              <a:t>לתמונה מצד ימין</a:t>
-            </a:r>
-          </a:p>
-          <a:p>
-            <a:pPr algn="r"/>
-            <a:r>
-              <a:rPr lang="he-IL" sz="4800" dirty="0" smtClean="0"/>
-              <a:t>לתמונה מצד שמאל</a:t>
-            </a:r>
-          </a:p>
-          <a:p>
-            <a:pPr algn="r"/>
-            <a:r>
-              <a:rPr lang="he-IL" sz="4800" dirty="0" smtClean="0"/>
-              <a:t>אם בחרת להימנע</a:t>
-            </a:r>
-            <a:endParaRPr lang="he-IL" sz="3600" dirty="0" smtClean="0"/>
+            <a:endParaRPr lang="he-IL" sz="6600" u="sng" dirty="0"/>
+          </a:p>
+          <a:p>
+            <a:pPr algn="r" rtl="1"/>
+            <a:r>
+              <a:rPr lang="en-US" sz="6000" dirty="0" smtClean="0"/>
+              <a:t>	</a:t>
+            </a:r>
+            <a:r>
+              <a:rPr lang="he-IL" sz="6000" dirty="0" smtClean="0"/>
+              <a:t>לתמונה </a:t>
+            </a:r>
+            <a:r>
+              <a:rPr lang="he-IL" sz="6000" dirty="0" smtClean="0"/>
+              <a:t>מצד </a:t>
+            </a:r>
+            <a:r>
+              <a:rPr lang="he-IL" sz="6000" dirty="0" smtClean="0"/>
+              <a:t>ימין</a:t>
+            </a:r>
+            <a:r>
+              <a:rPr lang="en-US" sz="6000" dirty="0" smtClean="0"/>
+              <a:t>  	</a:t>
+            </a:r>
+            <a:r>
+              <a:rPr lang="he-IL" sz="6000" dirty="0" smtClean="0"/>
+              <a:t>לתמונה </a:t>
+            </a:r>
+            <a:r>
+              <a:rPr lang="he-IL" sz="6000" dirty="0" smtClean="0"/>
+              <a:t>מצד שמאל</a:t>
+            </a:r>
           </a:p>
           <a:p>
             <a:pPr algn="ctr" rtl="1"/>
@@ -3872,8 +3830,8 @@
         </p:nvSpPr>
         <p:spPr>
           <a:xfrm>
-            <a:off x="8201297" y="2590801"/>
-            <a:ext cx="645523" cy="457200"/>
+            <a:off x="7391400" y="2870269"/>
+            <a:ext cx="1095103" cy="838200"/>
           </a:xfrm>
           <a:prstGeom prst="rightArrow">
             <a:avLst/>
@@ -3919,51 +3877,8 @@
         </p:nvSpPr>
         <p:spPr>
           <a:xfrm rot="10800000">
-            <a:off x="8153400" y="3352800"/>
-            <a:ext cx="693420" cy="457200"/>
-          </a:xfrm>
-          <a:prstGeom prst="rightArrow">
-            <a:avLst/>
-          </a:prstGeom>
-          <a:solidFill>
-            <a:srgbClr val="FF0000"/>
-          </a:solidFill>
-        </p:spPr>
-        <p:style>
-          <a:lnRef idx="2">
-            <a:schemeClr val="accent1">
-              <a:shade val="50000"/>
-            </a:schemeClr>
-          </a:lnRef>
-          <a:fillRef idx="1">
-            <a:schemeClr val="accent1"/>
-          </a:fillRef>
-          <a:effectRef idx="0">
-            <a:schemeClr val="accent1"/>
-          </a:effectRef>
-          <a:fontRef idx="minor">
-            <a:schemeClr val="lt1"/>
-          </a:fontRef>
-        </p:style>
-        <p:txBody>
-          <a:bodyPr rtlCol="0" anchor="ctr"/>
-          <a:lstStyle/>
-          <a:p>
-            <a:pPr algn="ctr"/>
-            <a:endParaRPr lang="en-US"/>
-          </a:p>
-        </p:txBody>
-      </p:sp>
-      <p:sp>
-        <p:nvSpPr>
-          <p:cNvPr id="12" name="Right Arrow 11"/>
-          <p:cNvSpPr/>
-          <p:nvPr/>
-        </p:nvSpPr>
-        <p:spPr>
-          <a:xfrm rot="5400000">
-            <a:off x="8211490" y="4096693"/>
-            <a:ext cx="515189" cy="435429"/>
+            <a:off x="7391400" y="3708469"/>
+            <a:ext cx="1090748" cy="863531"/>
           </a:xfrm>
           <a:prstGeom prst="rightArrow">
             <a:avLst/>
@@ -4082,11 +3997,7 @@
             </a:r>
             <a:r>
               <a:rPr lang="he-IL" sz="3600" smtClean="0"/>
-              <a:t>עד </a:t>
-            </a:r>
-            <a:r>
-              <a:rPr lang="he-IL" sz="3600" smtClean="0"/>
-              <a:t>10</a:t>
+              <a:t>עד 10</a:t>
             </a:r>
             <a:endParaRPr lang="he-IL" sz="3600" dirty="0" smtClean="0"/>
           </a:p>
@@ -4191,23 +4102,7 @@
             <a:pPr algn="r" rtl="1"/>
             <a:r>
               <a:rPr lang="he-IL" sz="3200" dirty="0" smtClean="0"/>
-              <a:t>לפני הצגת התמונות </a:t>
-            </a:r>
-            <a:r>
-              <a:rPr lang="he-IL" sz="3200" dirty="0" smtClean="0"/>
-              <a:t>יהיה + </a:t>
-            </a:r>
-            <a:r>
-              <a:rPr lang="he-IL" sz="3200" dirty="0" smtClean="0"/>
-              <a:t>באמצע של המסך, אנא הסתכל </a:t>
-            </a:r>
-            <a:r>
-              <a:rPr lang="he-IL" sz="3200" dirty="0" smtClean="0"/>
-              <a:t>עליו </a:t>
-            </a:r>
-            <a:r>
-              <a:rPr lang="he-IL" sz="3200" dirty="0" smtClean="0"/>
-              <a:t>בתחילת הניסוי.</a:t>
+              <a:t>לפני הצגת התמונות יהיה + באמצע של המסך, אנא הסתכל עליו בתחילת הניסוי.</a:t>
             </a:r>
           </a:p>
           <a:p>

</xml_diff>

<commit_message>
Add text that displays after the user input in the first block + chenge the instructions
</commit_message>
<xml_diff>
--- a/resources/screens generator.pptx
+++ b/resources/screens generator.pptx
@@ -312,7 +312,7 @@
           <a:p>
             <a:fld id="{3D0F2683-DC5F-4C11-8026-67D13E7C15A4}" type="datetimeFigureOut">
               <a:rPr lang="en-US" smtClean="0"/>
-              <a:t>3/24/2019</a:t>
+              <a:t>3/28/2019</a:t>
             </a:fld>
             <a:endParaRPr lang="en-US"/>
           </a:p>
@@ -482,7 +482,7 @@
           <a:p>
             <a:fld id="{3D0F2683-DC5F-4C11-8026-67D13E7C15A4}" type="datetimeFigureOut">
               <a:rPr lang="en-US" smtClean="0"/>
-              <a:t>3/24/2019</a:t>
+              <a:t>3/28/2019</a:t>
             </a:fld>
             <a:endParaRPr lang="en-US"/>
           </a:p>
@@ -662,7 +662,7 @@
           <a:p>
             <a:fld id="{3D0F2683-DC5F-4C11-8026-67D13E7C15A4}" type="datetimeFigureOut">
               <a:rPr lang="en-US" smtClean="0"/>
-              <a:t>3/24/2019</a:t>
+              <a:t>3/28/2019</a:t>
             </a:fld>
             <a:endParaRPr lang="en-US"/>
           </a:p>
@@ -832,7 +832,7 @@
           <a:p>
             <a:fld id="{3D0F2683-DC5F-4C11-8026-67D13E7C15A4}" type="datetimeFigureOut">
               <a:rPr lang="en-US" smtClean="0"/>
-              <a:t>3/24/2019</a:t>
+              <a:t>3/28/2019</a:t>
             </a:fld>
             <a:endParaRPr lang="en-US"/>
           </a:p>
@@ -1078,7 +1078,7 @@
           <a:p>
             <a:fld id="{3D0F2683-DC5F-4C11-8026-67D13E7C15A4}" type="datetimeFigureOut">
               <a:rPr lang="en-US" smtClean="0"/>
-              <a:t>3/24/2019</a:t>
+              <a:t>3/28/2019</a:t>
             </a:fld>
             <a:endParaRPr lang="en-US"/>
           </a:p>
@@ -1366,7 +1366,7 @@
           <a:p>
             <a:fld id="{3D0F2683-DC5F-4C11-8026-67D13E7C15A4}" type="datetimeFigureOut">
               <a:rPr lang="en-US" smtClean="0"/>
-              <a:t>3/24/2019</a:t>
+              <a:t>3/28/2019</a:t>
             </a:fld>
             <a:endParaRPr lang="en-US"/>
           </a:p>
@@ -1788,7 +1788,7 @@
           <a:p>
             <a:fld id="{3D0F2683-DC5F-4C11-8026-67D13E7C15A4}" type="datetimeFigureOut">
               <a:rPr lang="en-US" smtClean="0"/>
-              <a:t>3/24/2019</a:t>
+              <a:t>3/28/2019</a:t>
             </a:fld>
             <a:endParaRPr lang="en-US"/>
           </a:p>
@@ -1906,7 +1906,7 @@
           <a:p>
             <a:fld id="{3D0F2683-DC5F-4C11-8026-67D13E7C15A4}" type="datetimeFigureOut">
               <a:rPr lang="en-US" smtClean="0"/>
-              <a:t>3/24/2019</a:t>
+              <a:t>3/28/2019</a:t>
             </a:fld>
             <a:endParaRPr lang="en-US"/>
           </a:p>
@@ -2001,7 +2001,7 @@
           <a:p>
             <a:fld id="{3D0F2683-DC5F-4C11-8026-67D13E7C15A4}" type="datetimeFigureOut">
               <a:rPr lang="en-US" smtClean="0"/>
-              <a:t>3/24/2019</a:t>
+              <a:t>3/28/2019</a:t>
             </a:fld>
             <a:endParaRPr lang="en-US"/>
           </a:p>
@@ -2278,7 +2278,7 @@
           <a:p>
             <a:fld id="{3D0F2683-DC5F-4C11-8026-67D13E7C15A4}" type="datetimeFigureOut">
               <a:rPr lang="en-US" smtClean="0"/>
-              <a:t>3/24/2019</a:t>
+              <a:t>3/28/2019</a:t>
             </a:fld>
             <a:endParaRPr lang="en-US"/>
           </a:p>
@@ -2531,7 +2531,7 @@
           <a:p>
             <a:fld id="{3D0F2683-DC5F-4C11-8026-67D13E7C15A4}" type="datetimeFigureOut">
               <a:rPr lang="en-US" smtClean="0"/>
-              <a:t>3/24/2019</a:t>
+              <a:t>3/28/2019</a:t>
             </a:fld>
             <a:endParaRPr lang="en-US"/>
           </a:p>
@@ -2744,7 +2744,7 @@
           <a:p>
             <a:fld id="{3D0F2683-DC5F-4C11-8026-67D13E7C15A4}" type="datetimeFigureOut">
               <a:rPr lang="en-US" smtClean="0"/>
-              <a:t>3/24/2019</a:t>
+              <a:t>3/28/2019</a:t>
             </a:fld>
             <a:endParaRPr lang="en-US"/>
           </a:p>
@@ -3516,7 +3516,7 @@
         <p:spPr>
           <a:xfrm>
             <a:off x="360860" y="644094"/>
-            <a:ext cx="8478339" cy="5878532"/>
+            <a:ext cx="8478339" cy="6247864"/>
           </a:xfrm>
           <a:prstGeom prst="rect">
             <a:avLst/>
@@ -3562,7 +3562,27 @@
             <a:pPr algn="r" rtl="1"/>
             <a:r>
               <a:rPr lang="he-IL" sz="2400" dirty="0"/>
-              <a:t>כל צעד יתחיל בהצגה של הסימן + במרכז המסך. אנא התמקדו במרכזו עד שיופיעו תמונות המועמדים. לאחר הופעת שתי התמונות בחרו במועמד שלכם באמצעות החיצים. </a:t>
+              <a:t>כל צעד יתחיל בהצגה של הסימן + במרכז המסך. אנא התמקדו במרכזו עד שיופיעו תמונות המועמדים. </a:t>
+            </a:r>
+            <a:endParaRPr lang="he-IL" sz="2400" dirty="0" smtClean="0"/>
+          </a:p>
+          <a:p>
+            <a:pPr algn="r" rtl="1"/>
+            <a:r>
+              <a:rPr lang="he-IL" sz="2400" dirty="0" smtClean="0"/>
+              <a:t>התמונות </a:t>
+            </a:r>
+            <a:r>
+              <a:rPr lang="he-IL" sz="2400" dirty="0" smtClean="0"/>
+              <a:t>יוצגו למשך כמה שניות שניות ולאחר היעלמותן תוכלו לבחור</a:t>
+            </a:r>
+            <a:r>
+              <a:rPr lang="he-IL" sz="2400" dirty="0" smtClean="0"/>
+              <a:t> </a:t>
+            </a:r>
+            <a:r>
+              <a:rPr lang="he-IL" sz="2400" dirty="0"/>
+              <a:t>במועמד שלכם באמצעות החיצים. </a:t>
             </a:r>
           </a:p>
           <a:p>
@@ -3596,11 +3616,7 @@
             <a:pPr algn="r"/>
             <a:r>
               <a:rPr lang="he-IL" sz="4000" dirty="0" smtClean="0"/>
-              <a:t>     </a:t>
-            </a:r>
-            <a:r>
-              <a:rPr lang="he-IL" sz="4000" dirty="0" smtClean="0"/>
-              <a:t>לתמונה </a:t>
+              <a:t>     לתמונה </a:t>
             </a:r>
             <a:r>
               <a:rPr lang="he-IL" sz="4000" dirty="0"/>
@@ -3629,7 +3645,7 @@
         </p:nvSpPr>
         <p:spPr>
           <a:xfrm>
-            <a:off x="8176584" y="4572000"/>
+            <a:off x="8190628" y="4953000"/>
             <a:ext cx="645523" cy="457200"/>
           </a:xfrm>
           <a:prstGeom prst="rightArrow">
@@ -3676,7 +3692,7 @@
         </p:nvSpPr>
         <p:spPr>
           <a:xfrm rot="10800000">
-            <a:off x="8145779" y="5242513"/>
+            <a:off x="8142731" y="5562600"/>
             <a:ext cx="693420" cy="457200"/>
           </a:xfrm>
           <a:prstGeom prst="rightArrow">
@@ -3793,15 +3809,7 @@
             </a:r>
             <a:r>
               <a:rPr lang="he-IL" sz="6000" dirty="0" smtClean="0"/>
-              <a:t>לתמונה </a:t>
-            </a:r>
-            <a:r>
-              <a:rPr lang="he-IL" sz="6000" dirty="0" smtClean="0"/>
-              <a:t>מצד </a:t>
-            </a:r>
-            <a:r>
-              <a:rPr lang="he-IL" sz="6000" dirty="0" smtClean="0"/>
-              <a:t>ימין</a:t>
+              <a:t>לתמונה מצד ימין</a:t>
             </a:r>
             <a:r>
               <a:rPr lang="en-US" sz="6000" dirty="0" smtClean="0"/>
@@ -3809,11 +3817,7 @@
             </a:r>
             <a:r>
               <a:rPr lang="he-IL" sz="6000" dirty="0" smtClean="0"/>
-              <a:t>לתמונה </a:t>
-            </a:r>
-            <a:r>
-              <a:rPr lang="he-IL" sz="6000" dirty="0" smtClean="0"/>
-              <a:t>מצד שמאל</a:t>
+              <a:t>לתמונה מצד שמאל</a:t>
             </a:r>
           </a:p>
           <a:p>

</xml_diff>